<commit_message>
Fichiers pour la map
</commit_message>
<xml_diff>
--- a/assets/Map.pptx
+++ b/assets/Map.pptx
@@ -104,6 +104,11 @@
       </a:defRPr>
     </a:lvl9pPr>
   </p:defaultTextStyle>
+  <p:extLst>
+    <p:ext uri="{EFAFB233-063F-42B5-8137-9DF3F51BA10A}">
+      <p15:sldGuideLst xmlns:p15="http://schemas.microsoft.com/office/powerpoint/2012/main"/>
+    </p:ext>
+  </p:extLst>
 </p:presentation>
 </file>
 
@@ -3116,7 +3121,7 @@
           <a:prstGeom prst="line">
             <a:avLst/>
           </a:prstGeom>
-          <a:ln w="57150">
+          <a:ln w="3175">
             <a:solidFill>
               <a:schemeClr val="tx1"/>
             </a:solidFill>
@@ -3151,7 +3156,7 @@
           <a:prstGeom prst="line">
             <a:avLst/>
           </a:prstGeom>
-          <a:ln w="57150">
+          <a:ln w="3175">
             <a:solidFill>
               <a:schemeClr val="tx1"/>
             </a:solidFill>
@@ -3186,7 +3191,7 @@
           <a:prstGeom prst="line">
             <a:avLst/>
           </a:prstGeom>
-          <a:ln w="57150">
+          <a:ln w="3175">
             <a:solidFill>
               <a:schemeClr val="tx1"/>
             </a:solidFill>
@@ -3221,7 +3226,7 @@
           <a:prstGeom prst="line">
             <a:avLst/>
           </a:prstGeom>
-          <a:ln w="57150">
+          <a:ln w="3175">
             <a:solidFill>
               <a:schemeClr val="tx1"/>
             </a:solidFill>
@@ -3256,7 +3261,7 @@
           <a:prstGeom prst="line">
             <a:avLst/>
           </a:prstGeom>
-          <a:ln w="57150">
+          <a:ln w="3175">
             <a:solidFill>
               <a:schemeClr val="tx1"/>
             </a:solidFill>

</xml_diff>